<commit_message>
Class 14 Tweaks and updated demo
</commit_message>
<xml_diff>
--- a/curriculum/class-13/facilitator/resources/dependency-injection.pptx
+++ b/curriculum/class-13/facilitator/resources/dependency-injection.pptx
@@ -459,7 +459,7 @@
             <a:fld id="{5923F103-BC34-4FE4-A40E-EDDEECFDA5D0}" type="datetimeFigureOut">
               <a:rPr lang="en-US" dirty="0"/>
               <a:pPr/>
-              <a:t>1/25/21</a:t>
+              <a:t>7/27/21</a:t>
             </a:fld>
             <a:endParaRPr lang="en-US" dirty="0"/>
           </a:p>
@@ -1547,7 +1547,7 @@
           <a:p>
             <a:fld id="{923A1CC3-2375-41D4-9E03-427CAF2A4C1A}" type="datetimeFigureOut">
               <a:rPr lang="en-US" dirty="0"/>
-              <a:t>1/25/21</a:t>
+              <a:t>7/27/21</a:t>
             </a:fld>
             <a:endParaRPr lang="en-US" dirty="0"/>
           </a:p>
@@ -2527,7 +2527,7 @@
           <a:p>
             <a:fld id="{AFF16868-8199-4C2C-A5B1-63AEE139F88E}" type="datetimeFigureOut">
               <a:rPr lang="en-US" dirty="0"/>
-              <a:t>1/25/21</a:t>
+              <a:t>7/27/21</a:t>
             </a:fld>
             <a:endParaRPr lang="en-US" dirty="0"/>
           </a:p>
@@ -3661,7 +3661,7 @@
           <a:p>
             <a:fld id="{AAD9FF7F-6988-44CC-821B-644E70CD2F73}" type="datetimeFigureOut">
               <a:rPr lang="en-US" dirty="0"/>
-              <a:t>1/25/21</a:t>
+              <a:t>7/27/21</a:t>
             </a:fld>
             <a:endParaRPr lang="en-US" dirty="0"/>
           </a:p>
@@ -4694,7 +4694,7 @@
           <a:p>
             <a:fld id="{5C12C299-16B2-4475-990D-751901EACC14}" type="datetimeFigureOut">
               <a:rPr lang="en-US" dirty="0"/>
-              <a:t>1/25/21</a:t>
+              <a:t>7/27/21</a:t>
             </a:fld>
             <a:endParaRPr lang="en-US" dirty="0"/>
           </a:p>
@@ -5354,7 +5354,7 @@
           <a:p>
             <a:fld id="{9FE86839-B9D8-4651-8783-F325ECE74E65}" type="datetimeFigureOut">
               <a:rPr lang="en-US" dirty="0"/>
-              <a:t>1/25/21</a:t>
+              <a:t>7/27/21</a:t>
             </a:fld>
             <a:endParaRPr lang="en-US" dirty="0"/>
           </a:p>
@@ -6215,7 +6215,7 @@
           <a:p>
             <a:fld id="{FD484F64-32F6-45C5-931F-ADC1662401D0}" type="datetimeFigureOut">
               <a:rPr lang="en-US" dirty="0"/>
-              <a:t>1/25/21</a:t>
+              <a:t>7/27/21</a:t>
             </a:fld>
             <a:endParaRPr lang="en-US" dirty="0"/>
           </a:p>
@@ -6405,7 +6405,7 @@
           <a:p>
             <a:fld id="{53086D93-FCAC-47E0-A2EE-787E62CA814C}" type="datetimeFigureOut">
               <a:rPr lang="en-US" dirty="0"/>
-              <a:t>1/25/21</a:t>
+              <a:t>7/27/21</a:t>
             </a:fld>
             <a:endParaRPr lang="en-US" dirty="0"/>
           </a:p>
@@ -7377,7 +7377,7 @@
           <a:p>
             <a:fld id="{CDA879A6-0FD0-4734-A311-86BFCA472E6E}" type="datetimeFigureOut">
               <a:rPr lang="en-US" dirty="0"/>
-              <a:t>1/25/21</a:t>
+              <a:t>7/27/21</a:t>
             </a:fld>
             <a:endParaRPr lang="en-US" dirty="0"/>
           </a:p>
@@ -7588,7 +7588,7 @@
           <a:p>
             <a:fld id="{19C9CA7B-DFD4-44B5-8C60-D14B8CD1FB59}" type="datetimeFigureOut">
               <a:rPr lang="en-US" dirty="0"/>
-              <a:t>1/25/21</a:t>
+              <a:t>7/27/21</a:t>
             </a:fld>
             <a:endParaRPr lang="en-US" dirty="0"/>
           </a:p>
@@ -8622,7 +8622,7 @@
           <a:p>
             <a:fld id="{F34E6425-0181-43F2-84FC-787E803FD2F8}" type="datetimeFigureOut">
               <a:rPr lang="en-US" dirty="0"/>
-              <a:t>1/25/21</a:t>
+              <a:t>7/27/21</a:t>
             </a:fld>
             <a:endParaRPr lang="en-US" dirty="0"/>
           </a:p>
@@ -8894,7 +8894,7 @@
           <a:p>
             <a:fld id="{3BDB8791-F1B0-41E7-B7FD-A781E65C4266}" type="datetimeFigureOut">
               <a:rPr lang="en-US" dirty="0"/>
-              <a:t>1/25/21</a:t>
+              <a:t>7/27/21</a:t>
             </a:fld>
             <a:endParaRPr lang="en-US" dirty="0"/>
           </a:p>
@@ -9304,7 +9304,7 @@
           <a:p>
             <a:fld id="{5FDD63B2-E120-4ED8-B27B-C685F510A5FE}" type="datetimeFigureOut">
               <a:rPr lang="en-US" dirty="0"/>
-              <a:t>1/25/21</a:t>
+              <a:t>7/27/21</a:t>
             </a:fld>
             <a:endParaRPr lang="en-US" dirty="0"/>
           </a:p>
@@ -9431,7 +9431,7 @@
           <a:p>
             <a:fld id="{7AA18ACC-A947-437B-A130-35BD54FDF1E9}" type="datetimeFigureOut">
               <a:rPr lang="en-US" dirty="0"/>
-              <a:t>1/25/21</a:t>
+              <a:t>7/27/21</a:t>
             </a:fld>
             <a:endParaRPr lang="en-US" dirty="0"/>
           </a:p>
@@ -9526,7 +9526,7 @@
           <a:p>
             <a:fld id="{7C8D7E02-BCB8-4D50-A234-369438C08659}" type="datetimeFigureOut">
               <a:rPr lang="en-US" dirty="0"/>
-              <a:t>1/25/21</a:t>
+              <a:t>7/27/21</a:t>
             </a:fld>
             <a:endParaRPr lang="en-US" dirty="0"/>
           </a:p>
@@ -10607,7 +10607,7 @@
           <a:p>
             <a:fld id="{76E86A4C-8E40-4F87-A4F0-01A0687C5742}" type="datetimeFigureOut">
               <a:rPr lang="en-US" dirty="0"/>
-              <a:t>1/25/21</a:t>
+              <a:t>7/27/21</a:t>
             </a:fld>
             <a:endParaRPr lang="en-US" dirty="0"/>
           </a:p>
@@ -11715,7 +11715,7 @@
           <a:p>
             <a:fld id="{35E72C73-2D91-4E12-BA25-F0AA0C03599B}" type="datetimeFigureOut">
               <a:rPr lang="en-US" dirty="0"/>
-              <a:t>1/25/21</a:t>
+              <a:t>7/27/21</a:t>
             </a:fld>
             <a:endParaRPr lang="en-US" dirty="0"/>
           </a:p>
@@ -12712,7 +12712,7 @@
           <a:p>
             <a:fld id="{2BE451C3-0FF4-47C4-B829-773ADF60F88C}" type="datetimeFigureOut">
               <a:rPr lang="en-US" dirty="0"/>
-              <a:t>1/25/21</a:t>
+              <a:t>7/27/21</a:t>
             </a:fld>
             <a:endParaRPr lang="en-US" dirty="0"/>
           </a:p>
@@ -14424,7 +14424,7 @@
           <a:p>
             <a:r>
               <a:rPr lang="en-US" dirty="0"/>
-              <a:t>ADVATAGES</a:t>
+              <a:t>ADVANTAGES</a:t>
             </a:r>
           </a:p>
         </p:txBody>

</xml_diff>